<commit_message>
Changes to testing and profiling
</commit_message>
<xml_diff>
--- a/Lecture notes/4_Testing.pptx
+++ b/Lecture notes/4_Testing.pptx
@@ -212,7 +212,7 @@
           <a:p>
             <a:fld id="{267ACE9D-760E-BA46-8E19-B20E0DC13CFD}" type="datetimeFigureOut">
               <a:rPr lang="en-US" smtClean="0"/>
-              <a:t>9/20/23</a:t>
+              <a:t>9/21/23</a:t>
             </a:fld>
             <a:endParaRPr lang="en-US"/>
           </a:p>
@@ -898,16 +898,7 @@
           <a:p>
             <a:r>
               <a:rPr lang="en-US" dirty="0"/>
-              <a:t>I get it. You’re under enormous pressure to produce results. The weight given to things like publications, citations, impact factor, is quite high. So you focus on writing the little bit of code that will analyze your data, or build your simulation or whatever, so that you can get to that sweet point of getting a paper accepted in a journal. Testing your code, doesn’t help you with that. There is in fact a cost associated, with no obvious benefit. But really it’s like any other work you do in your academic career. All of the threads that need pulling, need to be pulled. And testing is just another thread.</a:t>
-            </a:r>
-          </a:p>
-          <a:p>
-            <a:endParaRPr lang="en-US" dirty="0"/>
-          </a:p>
-          <a:p>
-            <a:r>
-              <a:rPr lang="en-US" dirty="0"/>
-              <a:t>If you think, “I need to split this function into two.” You can write the test cases for those two functions first.</a:t>
+              <a:t>In reality, we adopt a mixture of waterfall and agile methodology. We construct a basic functionality model first, and write tests for it, and then expand in an iterative way, also expanding and updating our test cases.</a:t>
             </a:r>
           </a:p>
         </p:txBody>
@@ -1088,19 +1079,7 @@
           <a:bodyPr/>
           <a:lstStyle/>
           <a:p>
-            <a:r>
-              <a:rPr lang="en-US" dirty="0"/>
-              <a:t>I get it. You’re under enormous pressure to produce results. The weight given to things like publications, citations, impact factor, is quite high. So you focus on writing the little bit of code that will analyze your data, or build your simulation or whatever, so that you can get to that sweet point of getting a paper accepted in a journal. Testing your code, doesn’t help you with that. There is in fact a cost associated, with no obvious benefit. But really it’s like any other work you do in your academic career. All of the threads that need pulling, need to be pulled. And testing is just another thread.</a:t>
-            </a:r>
-          </a:p>
-          <a:p>
             <a:endParaRPr lang="en-US" dirty="0"/>
-          </a:p>
-          <a:p>
-            <a:r>
-              <a:rPr lang="en-US" dirty="0"/>
-              <a:t>If you think, “I need to split this function into two.” You can write the test cases for those two functions first.</a:t>
-            </a:r>
           </a:p>
         </p:txBody>
       </p:sp>
@@ -1291,7 +1270,15 @@
           <a:p>
             <a:r>
               <a:rPr lang="en-US" dirty="0"/>
-              <a:t>So let me just say, I hate testing. Almost everybody hates testing. You know that moment when you realize oh wow, I’ve got enough results to start writing this up as a paper! And then you have to begin the long slog of writing and rewriting, and paper_version_17.pdf, and reviewer comments, and writing rebuttals. Well that’s like testing. It’s annoying but it is incredibly useful.</a:t>
+              <a:t>The example is the Test and Trace software during covid. A company called </a:t>
+            </a:r>
+            <a:r>
+              <a:rPr lang="en-US" dirty="0" err="1"/>
+              <a:t>Sitel</a:t>
+            </a:r>
+            <a:r>
+              <a:rPr lang="en-US" dirty="0"/>
+              <a:t> developed Synergy, the software used for Test and Trace. Basically, there was a miscalculation when processing a bunch of records that prevented the NHS from contacting potentially infected people.</a:t>
             </a:r>
           </a:p>
           <a:p>
@@ -1300,16 +1287,15 @@
           <a:p>
             <a:r>
               <a:rPr lang="en-US" dirty="0"/>
-              <a:t>Waterfall is incredibly natural. It’s almost like how we do Science! Come up with a mathematical model and then test out that model.</a:t>
-            </a:r>
-          </a:p>
-          <a:p>
-            <a:endParaRPr lang="en-US" dirty="0"/>
-          </a:p>
-          <a:p>
+              <a:t>And back in 2010, Lorenzo, the new NHS software designed to revolutionized patient data. The company behind them, </a:t>
+            </a:r>
+            <a:r>
+              <a:rPr lang="en-US" dirty="0" err="1"/>
+              <a:t>iSoft</a:t>
+            </a:r>
             <a:r>
               <a:rPr lang="en-US" dirty="0"/>
-              <a:t>Personally, this is probably the methodology that I adopt the most.</a:t>
+              <a:t>, ran into some seriously problems when testing. </a:t>
             </a:r>
           </a:p>
         </p:txBody>
@@ -1394,28 +1380,7 @@
           <a:bodyPr/>
           <a:lstStyle/>
           <a:p>
-            <a:r>
-              <a:rPr lang="en-US" dirty="0"/>
-              <a:t>So let me just say, I hate testing. Almost everybody hates testing. You know that moment when you realize oh wow, I’ve got enough results to start writing this up as a paper! And then you have to begin the long slog of writing and rewriting, and paper_version_17.pdf, and reviewer comments, and writing rebuttals. Well that’s like testing. It’s annoying but it is incredibly useful.</a:t>
-            </a:r>
-          </a:p>
-          <a:p>
             <a:endParaRPr lang="en-US" dirty="0"/>
-          </a:p>
-          <a:p>
-            <a:r>
-              <a:rPr lang="en-US" dirty="0"/>
-              <a:t>Waterfall is incredibly natural. It’s almost like how we do Science! Come up with a mathematical model and then test out that model.</a:t>
-            </a:r>
-          </a:p>
-          <a:p>
-            <a:endParaRPr lang="en-US" dirty="0"/>
-          </a:p>
-          <a:p>
-            <a:r>
-              <a:rPr lang="en-US" dirty="0"/>
-              <a:t>Personally, this is probably the methodology that I adopt the most.</a:t>
-            </a:r>
           </a:p>
         </p:txBody>
       </p:sp>
@@ -1499,19 +1464,7 @@
           <a:bodyPr/>
           <a:lstStyle/>
           <a:p>
-            <a:r>
-              <a:rPr lang="en-US" dirty="0"/>
-              <a:t>I get it. You’re under enormous pressure to produce results. The weight given to things like publications, citations, impact factor, is quite high. So you focus on writing the little bit of code that will analyze your data, or build your simulation or whatever, so that you can get to that sweet point of getting a paper accepted in a journal. Testing your code, doesn’t help you with that. There is in fact a cost associated, with no obvious benefit. But really it’s like any other work you do in your academic career. All of the threads that need pulling, need to be pulled. And testing is just another thread.</a:t>
-            </a:r>
-          </a:p>
-          <a:p>
             <a:endParaRPr lang="en-US" dirty="0"/>
-          </a:p>
-          <a:p>
-            <a:r>
-              <a:rPr lang="en-US" dirty="0"/>
-              <a:t>If you think, “I need to split this function into two.” You can write the test cases for those two functions first.</a:t>
-            </a:r>
           </a:p>
         </p:txBody>
       </p:sp>
@@ -1595,19 +1548,7 @@
           <a:bodyPr/>
           <a:lstStyle/>
           <a:p>
-            <a:r>
-              <a:rPr lang="en-US" dirty="0"/>
-              <a:t>I get it. You’re under enormous pressure to produce results. The weight given to things like publications, citations, impact factor, is quite high. So you focus on writing the little bit of code that will analyze your data, or build your simulation or whatever, so that you can get to that sweet point of getting a paper accepted in a journal. Testing your code, doesn’t help you with that. There is in fact a cost associated, with no obvious benefit. But really it’s like any other work you do in your academic career. All of the threads that need pulling, need to be pulled. And testing is just another thread.</a:t>
-            </a:r>
-          </a:p>
-          <a:p>
             <a:endParaRPr lang="en-US" dirty="0"/>
-          </a:p>
-          <a:p>
-            <a:r>
-              <a:rPr lang="en-US" dirty="0"/>
-              <a:t>If you think, “I need to split this function into two.” You can write the test cases for those two functions first.</a:t>
-            </a:r>
           </a:p>
         </p:txBody>
       </p:sp>
@@ -1691,19 +1632,7 @@
           <a:bodyPr/>
           <a:lstStyle/>
           <a:p>
-            <a:r>
-              <a:rPr lang="en-US" dirty="0"/>
-              <a:t>I get it. You’re under enormous pressure to produce results. The weight given to things like publications, citations, impact factor, is quite high. So you focus on writing the little bit of code that will analyze your data, or build your simulation or whatever, so that you can get to that sweet point of getting a paper accepted in a journal. Testing your code, doesn’t help you with that. There is in fact a cost associated, with no obvious benefit. But really it’s like any other work you do in your academic career. All of the threads that need pulling, need to be pulled. And testing is just another thread.</a:t>
-            </a:r>
-          </a:p>
-          <a:p>
             <a:endParaRPr lang="en-US" dirty="0"/>
-          </a:p>
-          <a:p>
-            <a:r>
-              <a:rPr lang="en-US" dirty="0"/>
-              <a:t>If you think, “I need to split this function into two.” You can write the test cases for those two functions first.</a:t>
-            </a:r>
           </a:p>
         </p:txBody>
       </p:sp>
@@ -1787,19 +1716,7 @@
           <a:bodyPr/>
           <a:lstStyle/>
           <a:p>
-            <a:r>
-              <a:rPr lang="en-US" dirty="0"/>
-              <a:t>I get it. You’re under enormous pressure to produce results. The weight given to things like publications, citations, impact factor, is quite high. So you focus on writing the little bit of code that will analyze your data, or build your simulation or whatever, so that you can get to that sweet point of getting a paper accepted in a journal. Testing your code, doesn’t help you with that. There is in fact a cost associated, with no obvious benefit. But really it’s like any other work you do in your academic career. All of the threads that need pulling, need to be pulled. And testing is just another thread.</a:t>
-            </a:r>
-          </a:p>
-          <a:p>
             <a:endParaRPr lang="en-US" dirty="0"/>
-          </a:p>
-          <a:p>
-            <a:r>
-              <a:rPr lang="en-US" dirty="0"/>
-              <a:t>If you think, “I need to split this function into two.” You can write the test cases for those two functions first.</a:t>
-            </a:r>
           </a:p>
         </p:txBody>
       </p:sp>
@@ -2084,7 +2001,7 @@
           <a:p>
             <a:fld id="{DB3E76E8-6E38-D74E-B2EC-DD9CC27AB15A}" type="datetimeFigureOut">
               <a:rPr lang="en-US" smtClean="0"/>
-              <a:t>9/20/23</a:t>
+              <a:t>9/21/23</a:t>
             </a:fld>
             <a:endParaRPr lang="en-US"/>
           </a:p>
@@ -2284,7 +2201,7 @@
           <a:p>
             <a:fld id="{DB3E76E8-6E38-D74E-B2EC-DD9CC27AB15A}" type="datetimeFigureOut">
               <a:rPr lang="en-US" smtClean="0"/>
-              <a:t>9/20/23</a:t>
+              <a:t>9/21/23</a:t>
             </a:fld>
             <a:endParaRPr lang="en-US"/>
           </a:p>
@@ -2494,7 +2411,7 @@
           <a:p>
             <a:fld id="{DB3E76E8-6E38-D74E-B2EC-DD9CC27AB15A}" type="datetimeFigureOut">
               <a:rPr lang="en-US" smtClean="0"/>
-              <a:t>9/20/23</a:t>
+              <a:t>9/21/23</a:t>
             </a:fld>
             <a:endParaRPr lang="en-US"/>
           </a:p>
@@ -3461,7 +3378,7 @@
           <a:p>
             <a:fld id="{DB3E76E8-6E38-D74E-B2EC-DD9CC27AB15A}" type="datetimeFigureOut">
               <a:rPr lang="en-US" smtClean="0"/>
-              <a:t>9/20/23</a:t>
+              <a:t>9/21/23</a:t>
             </a:fld>
             <a:endParaRPr lang="en-US"/>
           </a:p>
@@ -3737,7 +3654,7 @@
           <a:p>
             <a:fld id="{DB3E76E8-6E38-D74E-B2EC-DD9CC27AB15A}" type="datetimeFigureOut">
               <a:rPr lang="en-US" smtClean="0"/>
-              <a:t>9/20/23</a:t>
+              <a:t>9/21/23</a:t>
             </a:fld>
             <a:endParaRPr lang="en-US"/>
           </a:p>
@@ -4005,7 +3922,7 @@
           <a:p>
             <a:fld id="{DB3E76E8-6E38-D74E-B2EC-DD9CC27AB15A}" type="datetimeFigureOut">
               <a:rPr lang="en-US" smtClean="0"/>
-              <a:t>9/20/23</a:t>
+              <a:t>9/21/23</a:t>
             </a:fld>
             <a:endParaRPr lang="en-US"/>
           </a:p>
@@ -4420,7 +4337,7 @@
           <a:p>
             <a:fld id="{DB3E76E8-6E38-D74E-B2EC-DD9CC27AB15A}" type="datetimeFigureOut">
               <a:rPr lang="en-US" smtClean="0"/>
-              <a:t>9/20/23</a:t>
+              <a:t>9/21/23</a:t>
             </a:fld>
             <a:endParaRPr lang="en-US"/>
           </a:p>
@@ -4562,7 +4479,7 @@
           <a:p>
             <a:fld id="{DB3E76E8-6E38-D74E-B2EC-DD9CC27AB15A}" type="datetimeFigureOut">
               <a:rPr lang="en-US" smtClean="0"/>
-              <a:t>9/20/23</a:t>
+              <a:t>9/21/23</a:t>
             </a:fld>
             <a:endParaRPr lang="en-US"/>
           </a:p>
@@ -4675,7 +4592,7 @@
           <a:p>
             <a:fld id="{DB3E76E8-6E38-D74E-B2EC-DD9CC27AB15A}" type="datetimeFigureOut">
               <a:rPr lang="en-US" smtClean="0"/>
-              <a:t>9/20/23</a:t>
+              <a:t>9/21/23</a:t>
             </a:fld>
             <a:endParaRPr lang="en-US"/>
           </a:p>
@@ -4988,7 +4905,7 @@
           <a:p>
             <a:fld id="{DB3E76E8-6E38-D74E-B2EC-DD9CC27AB15A}" type="datetimeFigureOut">
               <a:rPr lang="en-US" smtClean="0"/>
-              <a:t>9/20/23</a:t>
+              <a:t>9/21/23</a:t>
             </a:fld>
             <a:endParaRPr lang="en-US"/>
           </a:p>
@@ -5277,7 +5194,7 @@
           <a:p>
             <a:fld id="{DB3E76E8-6E38-D74E-B2EC-DD9CC27AB15A}" type="datetimeFigureOut">
               <a:rPr lang="en-US" smtClean="0"/>
-              <a:t>9/20/23</a:t>
+              <a:t>9/21/23</a:t>
             </a:fld>
             <a:endParaRPr lang="en-US"/>
           </a:p>
@@ -5520,7 +5437,7 @@
           <a:p>
             <a:fld id="{DB3E76E8-6E38-D74E-B2EC-DD9CC27AB15A}" type="datetimeFigureOut">
               <a:rPr lang="en-US" smtClean="0"/>
-              <a:t>9/20/23</a:t>
+              <a:t>9/21/23</a:t>
             </a:fld>
             <a:endParaRPr lang="en-US"/>
           </a:p>

</xml_diff>